<commit_message>
update intro slide deck
</commit_message>
<xml_diff>
--- a/assets/lectures/cbw/2020/full/RNASeq_Module1_IntrotoRNA.pptx
+++ b/assets/lectures/cbw/2020/full/RNASeq_Module1_IntrotoRNA.pptx
@@ -11515,26 +11515,23 @@
                 <a:spcPct val="80000"/>
               </a:lnSpc>
             </a:pPr>
+            <a:endParaRPr lang="en-US" sz="2600" dirty="0">
+              <a:latin typeface="Calibri" charset="0"/>
+              <a:ea typeface="ＭＳ Ｐゴシック" charset="0"/>
+            </a:endParaRPr>
+          </a:p>
+          <a:p>
+            <a:pPr>
+              <a:lnSpc>
+                <a:spcPct val="80000"/>
+              </a:lnSpc>
+            </a:pPr>
             <a:r>
               <a:rPr lang="en-US" sz="2600" dirty="0">
                 <a:latin typeface="Calibri" charset="0"/>
                 <a:ea typeface="ＭＳ Ｐゴシック" charset="0"/>
               </a:rPr>
-              <a:t>Good news:  1-2 lanes of recent Illumina </a:t>
-            </a:r>
-            <a:r>
-              <a:rPr lang="en-US" sz="2600" dirty="0" err="1">
-                <a:latin typeface="Calibri" charset="0"/>
-                <a:ea typeface="ＭＳ Ｐゴシック" charset="0"/>
-              </a:rPr>
-              <a:t>HiSeq</a:t>
-            </a:r>
-            <a:r>
-              <a:rPr lang="en-US" sz="2600" dirty="0">
-                <a:latin typeface="Calibri" charset="0"/>
-                <a:ea typeface="ＭＳ Ｐゴシック" charset="0"/>
-              </a:rPr>
-              <a:t> data should be enough for most purposes</a:t>
+              <a:t>For DGE analysis only, 30-40 million reads is a common recommendation. More replicates can be more valuable than deeper libraries. Short (e.g. 50-75bp), single-end reads may be used to drive cost down as low as possible.</a:t>
             </a:r>
           </a:p>
         </p:txBody>

</xml_diff>